<commit_message>
[Engineering PPT] add webpack-introduction.pptx
</commit_message>
<xml_diff>
--- a/engineering/2017/webpck.pptx
+++ b/engineering/2017/webpck.pptx
@@ -208,7 +208,7 @@
           <a:p>
             <a:fld id="{6076049E-703C-4EDB-981F-24ADD40EE493}" type="datetimeFigureOut">
               <a:rPr lang="en-US" smtClean="0"/>
-              <a:t>05-25-2017</a:t>
+              <a:t>07-07-2017</a:t>
             </a:fld>
             <a:endParaRPr lang="en-US"/>
           </a:p>
@@ -2382,7 +2382,7 @@
               <a:t>webpack</a:t>
             </a:r>
             <a:r>
-              <a:rPr lang="en-US" sz="1200" b="0" i="0" kern="1200">
+              <a:rPr lang="en-US" sz="1200" b="0" i="0" kern="1200" dirty="0">
                 <a:solidFill>
                   <a:schemeClr val="tx1"/>
                 </a:solidFill>
@@ -2604,7 +2604,7 @@
           <a:p>
             <a:fld id="{63F7325E-846C-4C22-9786-CF2B7230B14E}" type="datetimeFigureOut">
               <a:rPr lang="en-US" smtClean="0"/>
-              <a:t>05-25-2017</a:t>
+              <a:t>07-07-2017</a:t>
             </a:fld>
             <a:endParaRPr lang="en-US"/>
           </a:p>
@@ -2772,7 +2772,7 @@
           <a:p>
             <a:fld id="{63F7325E-846C-4C22-9786-CF2B7230B14E}" type="datetimeFigureOut">
               <a:rPr lang="en-US" smtClean="0"/>
-              <a:t>05-25-2017</a:t>
+              <a:t>07-07-2017</a:t>
             </a:fld>
             <a:endParaRPr lang="en-US"/>
           </a:p>
@@ -2950,7 +2950,7 @@
           <a:p>
             <a:fld id="{63F7325E-846C-4C22-9786-CF2B7230B14E}" type="datetimeFigureOut">
               <a:rPr lang="en-US" smtClean="0"/>
-              <a:t>05-25-2017</a:t>
+              <a:t>07-07-2017</a:t>
             </a:fld>
             <a:endParaRPr lang="en-US"/>
           </a:p>
@@ -3118,7 +3118,7 @@
           <a:p>
             <a:fld id="{63F7325E-846C-4C22-9786-CF2B7230B14E}" type="datetimeFigureOut">
               <a:rPr lang="en-US" smtClean="0"/>
-              <a:t>05-25-2017</a:t>
+              <a:t>07-07-2017</a:t>
             </a:fld>
             <a:endParaRPr lang="en-US"/>
           </a:p>
@@ -3363,7 +3363,7 @@
           <a:p>
             <a:fld id="{63F7325E-846C-4C22-9786-CF2B7230B14E}" type="datetimeFigureOut">
               <a:rPr lang="en-US" smtClean="0"/>
-              <a:t>05-25-2017</a:t>
+              <a:t>07-07-2017</a:t>
             </a:fld>
             <a:endParaRPr lang="en-US"/>
           </a:p>
@@ -3592,7 +3592,7 @@
           <a:p>
             <a:fld id="{63F7325E-846C-4C22-9786-CF2B7230B14E}" type="datetimeFigureOut">
               <a:rPr lang="en-US" smtClean="0"/>
-              <a:t>05-25-2017</a:t>
+              <a:t>07-07-2017</a:t>
             </a:fld>
             <a:endParaRPr lang="en-US"/>
           </a:p>
@@ -3956,7 +3956,7 @@
           <a:p>
             <a:fld id="{63F7325E-846C-4C22-9786-CF2B7230B14E}" type="datetimeFigureOut">
               <a:rPr lang="en-US" smtClean="0"/>
-              <a:t>05-25-2017</a:t>
+              <a:t>07-07-2017</a:t>
             </a:fld>
             <a:endParaRPr lang="en-US"/>
           </a:p>
@@ -4073,7 +4073,7 @@
           <a:p>
             <a:fld id="{63F7325E-846C-4C22-9786-CF2B7230B14E}" type="datetimeFigureOut">
               <a:rPr lang="en-US" smtClean="0"/>
-              <a:t>05-25-2017</a:t>
+              <a:t>07-07-2017</a:t>
             </a:fld>
             <a:endParaRPr lang="en-US"/>
           </a:p>
@@ -4168,7 +4168,7 @@
           <a:p>
             <a:fld id="{63F7325E-846C-4C22-9786-CF2B7230B14E}" type="datetimeFigureOut">
               <a:rPr lang="en-US" smtClean="0"/>
-              <a:t>05-25-2017</a:t>
+              <a:t>07-07-2017</a:t>
             </a:fld>
             <a:endParaRPr lang="en-US"/>
           </a:p>
@@ -4443,7 +4443,7 @@
           <a:p>
             <a:fld id="{63F7325E-846C-4C22-9786-CF2B7230B14E}" type="datetimeFigureOut">
               <a:rPr lang="en-US" smtClean="0"/>
-              <a:t>05-25-2017</a:t>
+              <a:t>07-07-2017</a:t>
             </a:fld>
             <a:endParaRPr lang="en-US"/>
           </a:p>
@@ -4695,7 +4695,7 @@
           <a:p>
             <a:fld id="{63F7325E-846C-4C22-9786-CF2B7230B14E}" type="datetimeFigureOut">
               <a:rPr lang="en-US" smtClean="0"/>
-              <a:t>05-25-2017</a:t>
+              <a:t>07-07-2017</a:t>
             </a:fld>
             <a:endParaRPr lang="en-US"/>
           </a:p>
@@ -4906,7 +4906,7 @@
           <a:p>
             <a:fld id="{63F7325E-846C-4C22-9786-CF2B7230B14E}" type="datetimeFigureOut">
               <a:rPr lang="en-US" smtClean="0"/>
-              <a:t>05-25-2017</a:t>
+              <a:t>07-07-2017</a:t>
             </a:fld>
             <a:endParaRPr lang="en-US"/>
           </a:p>
@@ -5456,14 +5456,11 @@
           </a:bodyPr>
           <a:lstStyle/>
           <a:p>
-            <a:r>
-              <a:rPr lang="en-US" dirty="0">
-                <a:solidFill>
-                  <a:schemeClr val="bg2"/>
-                </a:solidFill>
-              </a:rPr>
-              <a:t>ITA 2017</a:t>
-            </a:r>
+            <a:endParaRPr lang="en-US" dirty="0">
+              <a:solidFill>
+                <a:schemeClr val="bg2"/>
+              </a:solidFill>
+            </a:endParaRPr>
           </a:p>
         </p:txBody>
       </p:sp>
@@ -5957,20 +5954,12 @@
           </a:p>
           <a:p>
             <a:r>
-              <a:rPr lang="en-US" dirty="0" err="1">
-                <a:latin typeface="Roboto Light" panose="02000000000000000000" pitchFamily="2" charset="0"/>
-                <a:ea typeface="Roboto Light" panose="02000000000000000000" pitchFamily="2" charset="0"/>
-                <a:cs typeface="Roboto Light" panose="02000000000000000000" pitchFamily="2" charset="0"/>
-              </a:rPr>
-              <a:t>DRoad</a:t>
-            </a:r>
-            <a:r>
               <a:rPr lang="en-US" dirty="0">
                 <a:latin typeface="Roboto Light" panose="02000000000000000000" pitchFamily="2" charset="0"/>
                 <a:ea typeface="Roboto Light" panose="02000000000000000000" pitchFamily="2" charset="0"/>
                 <a:cs typeface="Roboto Light" panose="02000000000000000000" pitchFamily="2" charset="0"/>
               </a:rPr>
-              <a:t> Map</a:t>
+              <a:t>Road Map</a:t>
             </a:r>
           </a:p>
           <a:p>

</xml_diff>